<commit_message>
Completed draft 2 of topic 00
</commit_message>
<xml_diff>
--- a/Topics/00 - Start the Func/Functional First Programming with F#.pptx
+++ b/Topics/00 - Start the Func/Functional First Programming with F#.pptx
@@ -16,28 +16,30 @@
     <p:sldId id="297" r:id="rId10"/>
     <p:sldId id="266" r:id="rId11"/>
     <p:sldId id="279" r:id="rId12"/>
-    <p:sldId id="280" r:id="rId13"/>
-    <p:sldId id="281" r:id="rId14"/>
-    <p:sldId id="282" r:id="rId15"/>
+    <p:sldId id="298" r:id="rId13"/>
+    <p:sldId id="280" r:id="rId14"/>
+    <p:sldId id="281" r:id="rId15"/>
     <p:sldId id="268" r:id="rId16"/>
-    <p:sldId id="283" r:id="rId17"/>
-    <p:sldId id="284" r:id="rId18"/>
-    <p:sldId id="270" r:id="rId19"/>
-    <p:sldId id="285" r:id="rId20"/>
-    <p:sldId id="287" r:id="rId21"/>
-    <p:sldId id="288" r:id="rId22"/>
-    <p:sldId id="289" r:id="rId23"/>
-    <p:sldId id="286" r:id="rId24"/>
-    <p:sldId id="271" r:id="rId25"/>
-    <p:sldId id="290" r:id="rId26"/>
-    <p:sldId id="291" r:id="rId27"/>
-    <p:sldId id="294" r:id="rId28"/>
-    <p:sldId id="295" r:id="rId29"/>
-    <p:sldId id="292" r:id="rId30"/>
-    <p:sldId id="275" r:id="rId31"/>
-    <p:sldId id="273" r:id="rId32"/>
-    <p:sldId id="272" r:id="rId33"/>
-    <p:sldId id="261" r:id="rId34"/>
+    <p:sldId id="282" r:id="rId17"/>
+    <p:sldId id="299" r:id="rId18"/>
+    <p:sldId id="283" r:id="rId19"/>
+    <p:sldId id="284" r:id="rId20"/>
+    <p:sldId id="270" r:id="rId21"/>
+    <p:sldId id="285" r:id="rId22"/>
+    <p:sldId id="287" r:id="rId23"/>
+    <p:sldId id="288" r:id="rId24"/>
+    <p:sldId id="289" r:id="rId25"/>
+    <p:sldId id="286" r:id="rId26"/>
+    <p:sldId id="271" r:id="rId27"/>
+    <p:sldId id="290" r:id="rId28"/>
+    <p:sldId id="291" r:id="rId29"/>
+    <p:sldId id="294" r:id="rId30"/>
+    <p:sldId id="295" r:id="rId31"/>
+    <p:sldId id="292" r:id="rId32"/>
+    <p:sldId id="275" r:id="rId33"/>
+    <p:sldId id="273" r:id="rId34"/>
+    <p:sldId id="272" r:id="rId35"/>
+    <p:sldId id="261" r:id="rId36"/>
   </p:sldIdLst>
   <p:sldSz cx="12192000" cy="6858000"/>
   <p:notesSz cx="6858000" cy="9144000"/>
@@ -6185,6 +6187,89 @@
           <p:cNvPr id="2" name="Title 1">
             <a:extLst>
               <a:ext uri="{FF2B5EF4-FFF2-40B4-BE49-F238E27FC236}">
+                <a16:creationId xmlns:a16="http://schemas.microsoft.com/office/drawing/2014/main" id="{1E46A582-DCAB-4309-AB64-BC7282E1468D}"/>
+              </a:ext>
+            </a:extLst>
+          </p:cNvPr>
+          <p:cNvSpPr>
+            <a:spLocks noGrp="1"/>
+          </p:cNvSpPr>
+          <p:nvPr>
+            <p:ph type="title"/>
+          </p:nvPr>
+        </p:nvSpPr>
+        <p:spPr/>
+        <p:txBody>
+          <a:bodyPr/>
+          <a:lstStyle/>
+          <a:p>
+            <a:r>
+              <a:rPr lang="en-GB" dirty="0"/>
+              <a:t>Why Learn functional Programming?</a:t>
+            </a:r>
+          </a:p>
+        </p:txBody>
+      </p:sp>
+      <p:sp>
+        <p:nvSpPr>
+          <p:cNvPr id="3" name="Text Placeholder 2">
+            <a:extLst>
+              <a:ext uri="{FF2B5EF4-FFF2-40B4-BE49-F238E27FC236}">
+                <a16:creationId xmlns:a16="http://schemas.microsoft.com/office/drawing/2014/main" id="{5A27EC03-5143-4D5B-97F1-EDBB64CAAE78}"/>
+              </a:ext>
+            </a:extLst>
+          </p:cNvPr>
+          <p:cNvSpPr>
+            <a:spLocks noGrp="1"/>
+          </p:cNvSpPr>
+          <p:nvPr>
+            <p:ph type="body" idx="1"/>
+          </p:nvPr>
+        </p:nvSpPr>
+        <p:spPr/>
+        <p:txBody>
+          <a:bodyPr/>
+          <a:lstStyle/>
+          <a:p>
+            <a:endParaRPr lang="en-GB"/>
+          </a:p>
+        </p:txBody>
+      </p:sp>
+    </p:spTree>
+    <p:extLst>
+      <p:ext uri="{BB962C8B-B14F-4D97-AF65-F5344CB8AC3E}">
+        <p14:creationId xmlns:p14="http://schemas.microsoft.com/office/powerpoint/2010/main" val="2962323528"/>
+      </p:ext>
+    </p:extLst>
+  </p:cSld>
+  <p:clrMapOvr>
+    <a:masterClrMapping/>
+  </p:clrMapOvr>
+</p:sld>
+</file>
+
+<file path=ppt/slides/slide13.xml><?xml version="1.0" encoding="utf-8"?>
+<p:sld xmlns:a="http://schemas.openxmlformats.org/drawingml/2006/main" xmlns:r="http://schemas.openxmlformats.org/officeDocument/2006/relationships" xmlns:p="http://schemas.openxmlformats.org/presentationml/2006/main">
+  <p:cSld>
+    <p:spTree>
+      <p:nvGrpSpPr>
+        <p:cNvPr id="1" name=""/>
+        <p:cNvGrpSpPr/>
+        <p:nvPr/>
+      </p:nvGrpSpPr>
+      <p:grpSpPr>
+        <a:xfrm>
+          <a:off x="0" y="0"/>
+          <a:ext cx="0" cy="0"/>
+          <a:chOff x="0" y="0"/>
+          <a:chExt cx="0" cy="0"/>
+        </a:xfrm>
+      </p:grpSpPr>
+      <p:sp>
+        <p:nvSpPr>
+          <p:cNvPr id="2" name="Title 1">
+            <a:extLst>
+              <a:ext uri="{FF2B5EF4-FFF2-40B4-BE49-F238E27FC236}">
                 <a16:creationId xmlns:a16="http://schemas.microsoft.com/office/drawing/2014/main" id="{0873142D-3433-4087-8E26-1F9DAE7F345A}"/>
               </a:ext>
             </a:extLst>
@@ -6306,111 +6391,6 @@
 </p:sld>
 </file>
 
-<file path=ppt/slides/slide13.xml><?xml version="1.0" encoding="utf-8"?>
-<p:sld xmlns:a="http://schemas.openxmlformats.org/drawingml/2006/main" xmlns:r="http://schemas.openxmlformats.org/officeDocument/2006/relationships" xmlns:p="http://schemas.openxmlformats.org/presentationml/2006/main">
-  <p:cSld>
-    <p:spTree>
-      <p:nvGrpSpPr>
-        <p:cNvPr id="1" name=""/>
-        <p:cNvGrpSpPr/>
-        <p:nvPr/>
-      </p:nvGrpSpPr>
-      <p:grpSpPr>
-        <a:xfrm>
-          <a:off x="0" y="0"/>
-          <a:ext cx="0" cy="0"/>
-          <a:chOff x="0" y="0"/>
-          <a:chExt cx="0" cy="0"/>
-        </a:xfrm>
-      </p:grpSpPr>
-      <p:sp>
-        <p:nvSpPr>
-          <p:cNvPr id="2" name="Title 1">
-            <a:extLst>
-              <a:ext uri="{FF2B5EF4-FFF2-40B4-BE49-F238E27FC236}">
-                <a16:creationId xmlns:a16="http://schemas.microsoft.com/office/drawing/2014/main" id="{0873142D-3433-4087-8E26-1F9DAE7F345A}"/>
-              </a:ext>
-            </a:extLst>
-          </p:cNvPr>
-          <p:cNvSpPr>
-            <a:spLocks noGrp="1"/>
-          </p:cNvSpPr>
-          <p:nvPr>
-            <p:ph type="title"/>
-          </p:nvPr>
-        </p:nvSpPr>
-        <p:spPr/>
-        <p:txBody>
-          <a:bodyPr/>
-          <a:lstStyle/>
-          <a:p>
-            <a:r>
-              <a:rPr lang="en-GB" dirty="0"/>
-              <a:t>Why learn functional Programming?</a:t>
-            </a:r>
-          </a:p>
-        </p:txBody>
-      </p:sp>
-      <p:sp>
-        <p:nvSpPr>
-          <p:cNvPr id="3" name="Content Placeholder 2">
-            <a:extLst>
-              <a:ext uri="{FF2B5EF4-FFF2-40B4-BE49-F238E27FC236}">
-                <a16:creationId xmlns:a16="http://schemas.microsoft.com/office/drawing/2014/main" id="{2B84E1C0-C064-4080-A0EB-089DD5283036}"/>
-              </a:ext>
-            </a:extLst>
-          </p:cNvPr>
-          <p:cNvSpPr>
-            <a:spLocks noGrp="1"/>
-          </p:cNvSpPr>
-          <p:nvPr>
-            <p:ph idx="1"/>
-          </p:nvPr>
-        </p:nvSpPr>
-        <p:spPr/>
-        <p:txBody>
-          <a:bodyPr/>
-          <a:lstStyle/>
-          <a:p>
-            <a:r>
-              <a:rPr lang="en-GB" dirty="0"/>
-              <a:t>Because many languages are adopting functional features</a:t>
-            </a:r>
-          </a:p>
-          <a:p>
-            <a:pPr lvl="1"/>
-            <a:r>
-              <a:rPr lang="en-GB" dirty="0"/>
-              <a:t>C#, Java 8, </a:t>
-            </a:r>
-            <a:r>
-              <a:rPr lang="en-GB" dirty="0" err="1"/>
-              <a:t>Javascript</a:t>
-            </a:r>
-            <a:r>
-              <a:rPr lang="en-GB" dirty="0"/>
-              <a:t>, Swift and more are have all adopted features such as:</a:t>
-            </a:r>
-          </a:p>
-          <a:p>
-            <a:pPr lvl="2"/>
-            <a:endParaRPr lang="en-GB" dirty="0"/>
-          </a:p>
-        </p:txBody>
-      </p:sp>
-    </p:spTree>
-    <p:extLst>
-      <p:ext uri="{BB962C8B-B14F-4D97-AF65-F5344CB8AC3E}">
-        <p14:creationId xmlns:p14="http://schemas.microsoft.com/office/powerpoint/2010/main" val="1351502527"/>
-      </p:ext>
-    </p:extLst>
-  </p:cSld>
-  <p:clrMapOvr>
-    <a:masterClrMapping/>
-  </p:clrMapOvr>
-</p:sld>
-</file>
-
 <file path=ppt/slides/slide14.xml><?xml version="1.0" encoding="utf-8"?>
 <p:sld xmlns:a="http://schemas.openxmlformats.org/drawingml/2006/main" xmlns:r="http://schemas.openxmlformats.org/officeDocument/2006/relationships" xmlns:p="http://schemas.openxmlformats.org/presentationml/2006/main">
   <p:cSld>
@@ -6479,13 +6459,22 @@
           <a:p>
             <a:r>
               <a:rPr lang="en-GB" dirty="0"/>
-              <a:t>Because I’m curious, or people have told me it’s amazing.</a:t>
-            </a:r>
-          </a:p>
-          <a:p>
-            <a:r>
-              <a:rPr lang="en-GB" dirty="0"/>
-              <a:t>Learn a different way of thinking; and different way to approach problems </a:t>
+              <a:t>Because many languages are adopting functional features</a:t>
+            </a:r>
+          </a:p>
+          <a:p>
+            <a:pPr lvl="1"/>
+            <a:r>
+              <a:rPr lang="en-GB" dirty="0"/>
+              <a:t>C#, Java 8, </a:t>
+            </a:r>
+            <a:r>
+              <a:rPr lang="en-GB" dirty="0" err="1"/>
+              <a:t>Javascript</a:t>
+            </a:r>
+            <a:r>
+              <a:rPr lang="en-GB" dirty="0"/>
+              <a:t>, Swift and more are have all adopted features such as:</a:t>
             </a:r>
           </a:p>
           <a:p>
@@ -6497,7 +6486,7 @@
     </p:spTree>
     <p:extLst>
       <p:ext uri="{BB962C8B-B14F-4D97-AF65-F5344CB8AC3E}">
-        <p14:creationId xmlns:p14="http://schemas.microsoft.com/office/powerpoint/2010/main" val="3930500310"/>
+        <p14:creationId xmlns:p14="http://schemas.microsoft.com/office/powerpoint/2010/main" val="1351502527"/>
       </p:ext>
     </p:extLst>
   </p:cSld>
@@ -6586,6 +6575,27 @@
             <a:r>
               <a:rPr lang="en-GB" dirty="0"/>
               <a:t>Higher Order functions (C#, Java, Python, </a:t>
+            </a:r>
+            <a:r>
+              <a:rPr lang="en-GB" dirty="0" err="1"/>
+              <a:t>Javascript</a:t>
+            </a:r>
+            <a:r>
+              <a:rPr lang="en-GB" dirty="0"/>
+              <a:t>)</a:t>
+            </a:r>
+          </a:p>
+          <a:p>
+            <a:pPr lvl="1"/>
+            <a:r>
+              <a:rPr lang="en-GB" dirty="0"/>
+              <a:t>Data pipeline (C# LINQ, Java Streams, etc)</a:t>
+            </a:r>
+          </a:p>
+          <a:p>
+            <a:r>
+              <a:rPr lang="en-GB" dirty="0"/>
+              <a:t>First class functions (C#, </a:t>
             </a:r>
             <a:r>
               <a:rPr lang="en-GB" dirty="0" err="1"/>
@@ -6651,7 +6661,7 @@
           <p:cNvPr id="2" name="Title 1">
             <a:extLst>
               <a:ext uri="{FF2B5EF4-FFF2-40B4-BE49-F238E27FC236}">
-                <a16:creationId xmlns:a16="http://schemas.microsoft.com/office/drawing/2014/main" id="{38137A79-893F-490D-8FEB-B1D7C129BCB8}"/>
+                <a16:creationId xmlns:a16="http://schemas.microsoft.com/office/drawing/2014/main" id="{0873142D-3433-4087-8E26-1F9DAE7F345A}"/>
               </a:ext>
             </a:extLst>
           </p:cNvPr>
@@ -6669,7 +6679,7 @@
           <a:p>
             <a:r>
               <a:rPr lang="en-GB" dirty="0"/>
-              <a:t>What is the core functional programming? 	</a:t>
+              <a:t>Why learn functional Programming?</a:t>
             </a:r>
           </a:p>
         </p:txBody>
@@ -6679,7 +6689,7 @@
           <p:cNvPr id="3" name="Content Placeholder 2">
             <a:extLst>
               <a:ext uri="{FF2B5EF4-FFF2-40B4-BE49-F238E27FC236}">
-                <a16:creationId xmlns:a16="http://schemas.microsoft.com/office/drawing/2014/main" id="{C54ADF7E-4017-4349-A4C8-BF1560AE2746}"/>
+                <a16:creationId xmlns:a16="http://schemas.microsoft.com/office/drawing/2014/main" id="{2B84E1C0-C064-4080-A0EB-089DD5283036}"/>
               </a:ext>
             </a:extLst>
           </p:cNvPr>
@@ -6697,39 +6707,24 @@
           <a:p>
             <a:r>
               <a:rPr lang="en-GB" dirty="0"/>
-              <a:t>Its hard to reduce this down to a single statement. Some people have said some combination of:</a:t>
+              <a:t>Because I’m curious, or people have told me it’s amazing.</a:t>
+            </a:r>
+          </a:p>
+          <a:p>
+            <a:r>
+              <a:rPr lang="en-GB" dirty="0"/>
+              <a:t>Learn a different way of thinking; and different way to approach problems</a:t>
             </a:r>
           </a:p>
           <a:p>
             <a:pPr lvl="1"/>
             <a:r>
               <a:rPr lang="en-GB" dirty="0"/>
-              <a:t>First Class functions (Lambda calculus and higher order functions), </a:t>
-            </a:r>
-          </a:p>
-          <a:p>
-            <a:pPr lvl="1"/>
-            <a:r>
-              <a:rPr lang="en-GB" dirty="0"/>
-              <a:t>Algebraic Data types, </a:t>
-            </a:r>
-          </a:p>
-          <a:p>
-            <a:pPr lvl="1"/>
-            <a:r>
-              <a:rPr lang="en-GB" dirty="0"/>
-              <a:t>Immutability</a:t>
-            </a:r>
-          </a:p>
-          <a:p>
-            <a:pPr lvl="1"/>
-            <a:r>
-              <a:rPr lang="en-GB" dirty="0"/>
-              <a:t>Pure Functions</a:t>
-            </a:r>
-          </a:p>
-          <a:p>
-            <a:pPr lvl="1"/>
+              <a:t>(This is probably why people have difficulty with it)</a:t>
+            </a:r>
+          </a:p>
+          <a:p>
+            <a:pPr lvl="2"/>
             <a:endParaRPr lang="en-GB" dirty="0"/>
           </a:p>
         </p:txBody>
@@ -6737,7 +6732,7 @@
     </p:spTree>
     <p:extLst>
       <p:ext uri="{BB962C8B-B14F-4D97-AF65-F5344CB8AC3E}">
-        <p14:creationId xmlns:p14="http://schemas.microsoft.com/office/powerpoint/2010/main" val="457685717"/>
+        <p14:creationId xmlns:p14="http://schemas.microsoft.com/office/powerpoint/2010/main" val="3930500310"/>
       </p:ext>
     </p:extLst>
   </p:cSld>
@@ -6769,7 +6764,7 @@
           <p:cNvPr id="2" name="Title 1">
             <a:extLst>
               <a:ext uri="{FF2B5EF4-FFF2-40B4-BE49-F238E27FC236}">
-                <a16:creationId xmlns:a16="http://schemas.microsoft.com/office/drawing/2014/main" id="{28AA56CA-444E-4B50-9EF5-B5527DE14995}"/>
+                <a16:creationId xmlns:a16="http://schemas.microsoft.com/office/drawing/2014/main" id="{8FA2D410-4DF1-4894-AB82-3FCE8B50FF3F}"/>
               </a:ext>
             </a:extLst>
           </p:cNvPr>
@@ -6787,17 +6782,17 @@
           <a:p>
             <a:r>
               <a:rPr lang="en-GB" dirty="0"/>
-              <a:t>What is the core functional programming? 	</a:t>
-            </a:r>
-          </a:p>
-        </p:txBody>
-      </p:sp>
-      <p:sp>
-        <p:nvSpPr>
-          <p:cNvPr id="3" name="Content Placeholder 2">
+              <a:t>What is functional Programming?</a:t>
+            </a:r>
+          </a:p>
+        </p:txBody>
+      </p:sp>
+      <p:sp>
+        <p:nvSpPr>
+          <p:cNvPr id="3" name="Text Placeholder 2">
             <a:extLst>
               <a:ext uri="{FF2B5EF4-FFF2-40B4-BE49-F238E27FC236}">
-                <a16:creationId xmlns:a16="http://schemas.microsoft.com/office/drawing/2014/main" id="{6A048A30-033A-471C-905A-FC3AAF909752}"/>
+                <a16:creationId xmlns:a16="http://schemas.microsoft.com/office/drawing/2014/main" id="{DEADAE2A-B83A-44EE-9323-FF32167189F7}"/>
               </a:ext>
             </a:extLst>
           </p:cNvPr>
@@ -6805,81 +6800,22 @@
             <a:spLocks noGrp="1"/>
           </p:cNvSpPr>
           <p:nvPr>
-            <p:ph idx="1"/>
-          </p:nvPr>
-        </p:nvSpPr>
-        <p:spPr/>
-        <p:txBody>
-          <a:bodyPr>
-            <a:normAutofit/>
-          </a:bodyPr>
-          <a:lstStyle/>
-          <a:p>
-            <a:r>
-              <a:rPr lang="en-GB" dirty="0"/>
-              <a:t>For me, the things that are closest to the core are: </a:t>
-            </a:r>
-          </a:p>
-          <a:p>
-            <a:pPr marL="514350" indent="-514350">
-              <a:buFont typeface="+mj-lt"/>
-              <a:buAutoNum type="arabicPeriod"/>
-            </a:pPr>
-            <a:r>
-              <a:rPr lang="en-GB" dirty="0"/>
-              <a:t>Declarative programming with first order functions</a:t>
-            </a:r>
-          </a:p>
-          <a:p>
-            <a:pPr marL="514350" indent="-514350">
-              <a:buFont typeface="+mj-lt"/>
-              <a:buAutoNum type="arabicPeriod"/>
-            </a:pPr>
-            <a:r>
-              <a:rPr lang="en-GB" dirty="0"/>
-              <a:t>Purity (Absence of side effects):</a:t>
-            </a:r>
-          </a:p>
-          <a:p>
-            <a:pPr marL="0" indent="0">
-              <a:buNone/>
-            </a:pPr>
-            <a:endParaRPr lang="en-GB" dirty="0"/>
-          </a:p>
-          <a:p>
-            <a:pPr marL="0" indent="0">
-              <a:buNone/>
-            </a:pPr>
-            <a:r>
-              <a:rPr lang="en-GB" sz="2000" i="1" dirty="0"/>
-              <a:t>"Functional code is characterised by one thing: the absence of side effects. It doesn’t rely on data outside the current function, and it doesn’t change data that exists outside the current function. Every other “functional” thing can be derived from this property." </a:t>
-            </a:r>
-            <a:br>
-              <a:rPr lang="en-GB" sz="2400" dirty="0"/>
-            </a:br>
-            <a:r>
-              <a:rPr lang="en-GB" sz="1400" dirty="0">
-                <a:hlinkClick r:id="rId2"/>
-              </a:rPr>
-              <a:t>https://maryrosecook.com/blog/post/a-practical-introduction-to-functional-programming</a:t>
-            </a:r>
-            <a:r>
-              <a:rPr lang="en-GB" sz="1400" dirty="0"/>
-              <a:t> </a:t>
-            </a:r>
-          </a:p>
-          <a:p>
-            <a:pPr marL="0" indent="0">
-              <a:buNone/>
-            </a:pPr>
-            <a:endParaRPr lang="en-GB" dirty="0"/>
+            <p:ph type="body" idx="1"/>
+          </p:nvPr>
+        </p:nvSpPr>
+        <p:spPr/>
+        <p:txBody>
+          <a:bodyPr/>
+          <a:lstStyle/>
+          <a:p>
+            <a:endParaRPr lang="en-GB"/>
           </a:p>
         </p:txBody>
       </p:sp>
     </p:spTree>
     <p:extLst>
       <p:ext uri="{BB962C8B-B14F-4D97-AF65-F5344CB8AC3E}">
-        <p14:creationId xmlns:p14="http://schemas.microsoft.com/office/powerpoint/2010/main" val="4219929151"/>
+        <p14:creationId xmlns:p14="http://schemas.microsoft.com/office/powerpoint/2010/main" val="2015787583"/>
       </p:ext>
     </p:extLst>
   </p:cSld>
@@ -6911,7 +6847,7 @@
           <p:cNvPr id="2" name="Title 1">
             <a:extLst>
               <a:ext uri="{FF2B5EF4-FFF2-40B4-BE49-F238E27FC236}">
-                <a16:creationId xmlns:a16="http://schemas.microsoft.com/office/drawing/2014/main" id="{C3EA0152-43CF-49A3-9F27-D6055A3185BA}"/>
+                <a16:creationId xmlns:a16="http://schemas.microsoft.com/office/drawing/2014/main" id="{38137A79-893F-490D-8FEB-B1D7C129BCB8}"/>
               </a:ext>
             </a:extLst>
           </p:cNvPr>
@@ -6929,7 +6865,7 @@
           <a:p>
             <a:r>
               <a:rPr lang="en-GB" dirty="0"/>
-              <a:t>Functional programming characteristics</a:t>
+              <a:t>What is the core functional programming? 	</a:t>
             </a:r>
           </a:p>
         </p:txBody>
@@ -6939,7 +6875,7 @@
           <p:cNvPr id="3" name="Content Placeholder 2">
             <a:extLst>
               <a:ext uri="{FF2B5EF4-FFF2-40B4-BE49-F238E27FC236}">
-                <a16:creationId xmlns:a16="http://schemas.microsoft.com/office/drawing/2014/main" id="{4D41C678-B6AD-4294-8012-E0E1885FE9F2}"/>
+                <a16:creationId xmlns:a16="http://schemas.microsoft.com/office/drawing/2014/main" id="{C54ADF7E-4017-4349-A4C8-BF1560AE2746}"/>
               </a:ext>
             </a:extLst>
           </p:cNvPr>
@@ -6950,98 +6886,43 @@
             <p:ph idx="1"/>
           </p:nvPr>
         </p:nvSpPr>
-        <p:spPr>
-          <a:xfrm>
-            <a:off x="677334" y="1571349"/>
-            <a:ext cx="8596668" cy="4470014"/>
-          </a:xfrm>
-        </p:spPr>
-        <p:txBody>
-          <a:bodyPr/>
-          <a:lstStyle/>
-          <a:p>
-            <a:pPr marL="0" indent="0">
-              <a:buNone/>
-            </a:pPr>
-            <a:r>
-              <a:rPr lang="en-GB" dirty="0"/>
-              <a:t>Essentially all of the important stuff:</a:t>
+        <p:spPr/>
+        <p:txBody>
+          <a:bodyPr/>
+          <a:lstStyle/>
+          <a:p>
+            <a:r>
+              <a:rPr lang="en-GB" dirty="0"/>
+              <a:t>Its hard to reduce this down to a single statement. Some people have said some combination of:</a:t>
             </a:r>
           </a:p>
           <a:p>
             <a:pPr lvl="1"/>
             <a:r>
               <a:rPr lang="en-GB" dirty="0"/>
-              <a:t>First class functions (Higher order functions etc)</a:t>
+              <a:t>First Class functions (Lambda calculus and higher order functions), </a:t>
             </a:r>
           </a:p>
           <a:p>
             <a:pPr lvl="1"/>
             <a:r>
               <a:rPr lang="en-GB" dirty="0"/>
-              <a:t>Recursion and Tail call optimisation </a:t>
+              <a:t>Algebraic Data types, </a:t>
             </a:r>
           </a:p>
           <a:p>
             <a:pPr lvl="1"/>
             <a:r>
               <a:rPr lang="en-GB" dirty="0"/>
-              <a:t>Currying </a:t>
+              <a:t>Immutability</a:t>
             </a:r>
           </a:p>
           <a:p>
             <a:pPr lvl="1"/>
             <a:r>
               <a:rPr lang="en-GB" dirty="0"/>
-              <a:t>Partial application</a:t>
-            </a:r>
-          </a:p>
-          <a:p>
-            <a:pPr lvl="1"/>
-            <a:r>
-              <a:rPr lang="en-GB" dirty="0"/>
-              <a:t>Pipelining </a:t>
-            </a:r>
-          </a:p>
-          <a:p>
-            <a:pPr lvl="1"/>
-            <a:r>
-              <a:rPr lang="en-GB" dirty="0"/>
-              <a:t>Algebraic Data Types</a:t>
-            </a:r>
-          </a:p>
-          <a:p>
-            <a:pPr lvl="1"/>
-            <a:r>
-              <a:rPr lang="en-GB" dirty="0"/>
-              <a:t>Immutable Data</a:t>
-            </a:r>
-          </a:p>
-          <a:p>
-            <a:pPr lvl="1"/>
-            <a:r>
-              <a:rPr lang="en-GB" dirty="0"/>
-              <a:t>Pattern Matching</a:t>
-            </a:r>
-          </a:p>
-          <a:p>
-            <a:pPr lvl="1"/>
-            <a:r>
-              <a:rPr lang="en-GB" dirty="0"/>
-              <a:t>Laziness</a:t>
-            </a:r>
-          </a:p>
-          <a:p>
-            <a:pPr marL="457200" lvl="1" indent="0">
-              <a:buNone/>
-            </a:pPr>
-            <a:endParaRPr lang="en-GB" dirty="0"/>
-          </a:p>
-          <a:p>
-            <a:pPr marL="457200" lvl="1" indent="0">
-              <a:buNone/>
-            </a:pPr>
-            <a:endParaRPr lang="en-GB" dirty="0"/>
+              <a:t>Pure Functions</a:t>
+            </a:r>
           </a:p>
           <a:p>
             <a:pPr lvl="1"/>
@@ -7052,7 +6933,7 @@
     </p:spTree>
     <p:extLst>
       <p:ext uri="{BB962C8B-B14F-4D97-AF65-F5344CB8AC3E}">
-        <p14:creationId xmlns:p14="http://schemas.microsoft.com/office/powerpoint/2010/main" val="3132465871"/>
+        <p14:creationId xmlns:p14="http://schemas.microsoft.com/office/powerpoint/2010/main" val="457685717"/>
       </p:ext>
     </p:extLst>
   </p:cSld>
@@ -7084,7 +6965,7 @@
           <p:cNvPr id="2" name="Title 1">
             <a:extLst>
               <a:ext uri="{FF2B5EF4-FFF2-40B4-BE49-F238E27FC236}">
-                <a16:creationId xmlns:a16="http://schemas.microsoft.com/office/drawing/2014/main" id="{C3EA0152-43CF-49A3-9F27-D6055A3185BA}"/>
+                <a16:creationId xmlns:a16="http://schemas.microsoft.com/office/drawing/2014/main" id="{28AA56CA-444E-4B50-9EF5-B5527DE14995}"/>
               </a:ext>
             </a:extLst>
           </p:cNvPr>
@@ -7102,7 +6983,7 @@
           <a:p>
             <a:r>
               <a:rPr lang="en-GB" dirty="0"/>
-              <a:t>Functional programming characteristics</a:t>
+              <a:t>What is the core functional programming? 	</a:t>
             </a:r>
           </a:p>
         </p:txBody>
@@ -7112,7 +6993,7 @@
           <p:cNvPr id="3" name="Content Placeholder 2">
             <a:extLst>
               <a:ext uri="{FF2B5EF4-FFF2-40B4-BE49-F238E27FC236}">
-                <a16:creationId xmlns:a16="http://schemas.microsoft.com/office/drawing/2014/main" id="{4D41C678-B6AD-4294-8012-E0E1885FE9F2}"/>
+                <a16:creationId xmlns:a16="http://schemas.microsoft.com/office/drawing/2014/main" id="{6A048A30-033A-471C-905A-FC3AAF909752}"/>
               </a:ext>
             </a:extLst>
           </p:cNvPr>
@@ -7123,101 +7004,70 @@
             <p:ph idx="1"/>
           </p:nvPr>
         </p:nvSpPr>
-        <p:spPr>
-          <a:xfrm>
-            <a:off x="677334" y="1571349"/>
-            <a:ext cx="8596668" cy="4470014"/>
-          </a:xfrm>
-        </p:spPr>
-        <p:txBody>
-          <a:bodyPr/>
-          <a:lstStyle/>
+        <p:spPr/>
+        <p:txBody>
+          <a:bodyPr>
+            <a:normAutofit/>
+          </a:bodyPr>
+          <a:lstStyle/>
+          <a:p>
+            <a:r>
+              <a:rPr lang="en-GB" dirty="0"/>
+              <a:t>For me, the things that are closest to the core are: </a:t>
+            </a:r>
+          </a:p>
+          <a:p>
+            <a:pPr marL="514350" indent="-514350">
+              <a:buFont typeface="+mj-lt"/>
+              <a:buAutoNum type="arabicPeriod"/>
+            </a:pPr>
+            <a:r>
+              <a:rPr lang="en-GB" dirty="0"/>
+              <a:t>Declarative programming with first order functions</a:t>
+            </a:r>
+          </a:p>
+          <a:p>
+            <a:pPr marL="514350" indent="-514350">
+              <a:buFont typeface="+mj-lt"/>
+              <a:buAutoNum type="arabicPeriod"/>
+            </a:pPr>
+            <a:r>
+              <a:rPr lang="en-GB" dirty="0"/>
+              <a:t>Purity (Absence of side effects):</a:t>
+            </a:r>
+          </a:p>
           <a:p>
             <a:pPr marL="0" indent="0">
-              <a:buNone/>
-            </a:pPr>
-            <a:r>
-              <a:rPr lang="en-GB" dirty="0"/>
-              <a:t>Essentially all of the important stuff:</a:t>
-            </a:r>
-          </a:p>
-          <a:p>
-            <a:pPr lvl="1"/>
-            <a:r>
-              <a:rPr lang="en-GB" dirty="0"/>
-              <a:t>First class functions (Higher order functions etc) – Functions</a:t>
-            </a:r>
-          </a:p>
-          <a:p>
-            <a:pPr lvl="1"/>
-            <a:r>
-              <a:rPr lang="en-GB" dirty="0"/>
-              <a:t>Recursion and Tail call optimisation - Functions</a:t>
-            </a:r>
-          </a:p>
-          <a:p>
-            <a:pPr lvl="1"/>
-            <a:r>
-              <a:rPr lang="en-GB" dirty="0"/>
-              <a:t>Currying - Functions</a:t>
-            </a:r>
-          </a:p>
-          <a:p>
-            <a:pPr lvl="1"/>
-            <a:r>
-              <a:rPr lang="en-GB" dirty="0"/>
-              <a:t>Partial application - Functions</a:t>
-            </a:r>
-          </a:p>
-          <a:p>
-            <a:pPr lvl="1"/>
-            <a:r>
-              <a:rPr lang="en-GB" dirty="0"/>
-              <a:t>Pipelining - Functions</a:t>
-            </a:r>
-          </a:p>
-          <a:p>
-            <a:pPr lvl="1"/>
-            <a:r>
-              <a:rPr lang="en-GB" dirty="0"/>
-              <a:t>Algebraic Data Types – Data</a:t>
-            </a:r>
-          </a:p>
-          <a:p>
-            <a:pPr lvl="1"/>
-            <a:r>
-              <a:rPr lang="en-GB" dirty="0"/>
-              <a:t>Immutable Data - Data</a:t>
-            </a:r>
-          </a:p>
-          <a:p>
-            <a:pPr lvl="1"/>
-            <a:r>
-              <a:rPr lang="en-GB" dirty="0"/>
-              <a:t>Pattern Matching – Data and Functions</a:t>
-            </a:r>
-          </a:p>
-          <a:p>
-            <a:pPr lvl="1"/>
-            <a:r>
-              <a:rPr lang="en-GB" dirty="0"/>
-              <a:t>Laziness – Functions and ??</a:t>
-            </a:r>
-          </a:p>
-          <a:p>
-            <a:pPr marL="457200" lvl="1" indent="0">
               <a:buNone/>
             </a:pPr>
             <a:endParaRPr lang="en-GB" dirty="0"/>
           </a:p>
           <a:p>
-            <a:pPr marL="457200" lvl="1" indent="0">
+            <a:pPr marL="0" indent="0">
               <a:buNone/>
             </a:pPr>
-            <a:endParaRPr lang="en-GB" dirty="0"/>
-          </a:p>
-          <a:p>
-            <a:pPr lvl="1"/>
+            <a:r>
+              <a:rPr lang="en-GB" sz="2000" i="1" dirty="0"/>
+              <a:t>"Functional code is characterised by one thing: the absence of side effects. It doesn’t rely on data outside the current function, and it doesn’t change data that exists outside the current function. Every other “functional” thing can be derived from this property." </a:t>
+            </a:r>
+            <a:br>
+              <a:rPr lang="en-GB" sz="2400" dirty="0"/>
+            </a:br>
+            <a:r>
+              <a:rPr lang="en-GB" sz="1400" dirty="0">
+                <a:hlinkClick r:id="rId2"/>
+              </a:rPr>
+              <a:t>https://maryrosecook.com/blog/post/a-practical-introduction-to-functional-programming</a:t>
+            </a:r>
+            <a:r>
+              <a:rPr lang="en-GB" sz="1400" dirty="0"/>
+              <a:t> </a:t>
+            </a:r>
+          </a:p>
+          <a:p>
+            <a:pPr marL="0" indent="0">
+              <a:buNone/>
+            </a:pPr>
             <a:endParaRPr lang="en-GB" dirty="0"/>
           </a:p>
         </p:txBody>
@@ -7225,7 +7075,7 @@
     </p:spTree>
     <p:extLst>
       <p:ext uri="{BB962C8B-B14F-4D97-AF65-F5344CB8AC3E}">
-        <p14:creationId xmlns:p14="http://schemas.microsoft.com/office/powerpoint/2010/main" val="1187350171"/>
+        <p14:creationId xmlns:p14="http://schemas.microsoft.com/office/powerpoint/2010/main" val="4219929151"/>
       </p:ext>
     </p:extLst>
   </p:cSld>
@@ -7381,7 +7231,7 @@
           <p:cNvPr id="2" name="Title 1">
             <a:extLst>
               <a:ext uri="{FF2B5EF4-FFF2-40B4-BE49-F238E27FC236}">
-                <a16:creationId xmlns:a16="http://schemas.microsoft.com/office/drawing/2014/main" id="{95BAC10B-5402-42E4-AD48-A5265B068621}"/>
+                <a16:creationId xmlns:a16="http://schemas.microsoft.com/office/drawing/2014/main" id="{C3EA0152-43CF-49A3-9F27-D6055A3185BA}"/>
               </a:ext>
             </a:extLst>
           </p:cNvPr>
@@ -7392,19 +7242,14 @@
             <p:ph type="title"/>
           </p:nvPr>
         </p:nvSpPr>
-        <p:spPr>
-          <a:xfrm>
-            <a:off x="677334" y="609600"/>
-            <a:ext cx="8596668" cy="864093"/>
-          </a:xfrm>
-        </p:spPr>
-        <p:txBody>
-          <a:bodyPr/>
-          <a:lstStyle/>
-          <a:p>
-            <a:r>
-              <a:rPr lang="en-GB" dirty="0"/>
-              <a:t>Functional First Programming with F#</a:t>
+        <p:spPr/>
+        <p:txBody>
+          <a:bodyPr/>
+          <a:lstStyle/>
+          <a:p>
+            <a:r>
+              <a:rPr lang="en-GB" dirty="0"/>
+              <a:t>Functional programming characteristics</a:t>
             </a:r>
           </a:p>
         </p:txBody>
@@ -7414,7 +7259,7 @@
           <p:cNvPr id="3" name="Content Placeholder 2">
             <a:extLst>
               <a:ext uri="{FF2B5EF4-FFF2-40B4-BE49-F238E27FC236}">
-                <a16:creationId xmlns:a16="http://schemas.microsoft.com/office/drawing/2014/main" id="{A5CC9200-C372-4FE5-8C50-BE5E49CA61A2}"/>
+                <a16:creationId xmlns:a16="http://schemas.microsoft.com/office/drawing/2014/main" id="{4D41C678-B6AD-4294-8012-E0E1885FE9F2}"/>
               </a:ext>
             </a:extLst>
           </p:cNvPr>
@@ -7427,67 +7272,99 @@
         </p:nvSpPr>
         <p:spPr>
           <a:xfrm>
-            <a:off x="677334" y="1473693"/>
-            <a:ext cx="9105858" cy="4567669"/>
+            <a:off x="677334" y="1571349"/>
+            <a:ext cx="8596668" cy="4470014"/>
           </a:xfrm>
         </p:spPr>
         <p:txBody>
           <a:bodyPr/>
           <a:lstStyle/>
           <a:p>
-            <a:r>
-              <a:rPr lang="en-GB" dirty="0"/>
-              <a:t>We will talk about this properly later, but what is Functional First Programming and why F#? </a:t>
-            </a:r>
-          </a:p>
-          <a:p>
-            <a:endParaRPr lang="en-GB" dirty="0"/>
-          </a:p>
-          <a:p>
             <a:pPr marL="0" indent="0">
               <a:buNone/>
             </a:pPr>
             <a:r>
-              <a:rPr lang="en-GB" i="1" dirty="0"/>
-              <a:t>"There is an interesting phenomenon happening at Xamarin. Whenever one of our engineers starts working with F#, they tend to embrace it and stay there." </a:t>
-            </a:r>
-            <a:br>
-              <a:rPr lang="en-GB" dirty="0"/>
-            </a:br>
-            <a:endParaRPr lang="en-GB" dirty="0"/>
-          </a:p>
-          <a:p>
-            <a:pPr marL="0" indent="0">
-              <a:buNone/>
-            </a:pPr>
-            <a:r>
-              <a:rPr lang="en-GB" dirty="0"/>
-              <a:t>Miguel de </a:t>
-            </a:r>
-            <a:r>
-              <a:rPr lang="en-GB" dirty="0" err="1"/>
-              <a:t>Icaza</a:t>
-            </a:r>
-            <a:r>
-              <a:rPr lang="en-GB" dirty="0"/>
-              <a:t>, best known for starting the </a:t>
-            </a:r>
-            <a:r>
-              <a:rPr lang="en-GB" dirty="0" err="1"/>
-              <a:t>GNOME,Mono</a:t>
-            </a:r>
-            <a:r>
-              <a:rPr lang="en-GB" dirty="0"/>
-              <a:t> and Xamarin projects</a:t>
-            </a:r>
-          </a:p>
-          <a:p>
-            <a:pPr marL="0" indent="0">
+              <a:rPr lang="en-GB" dirty="0"/>
+              <a:t>Essentially all of the important stuff:</a:t>
+            </a:r>
+          </a:p>
+          <a:p>
+            <a:pPr lvl="1"/>
+            <a:r>
+              <a:rPr lang="en-GB" dirty="0"/>
+              <a:t>First class functions (Higher order functions etc)</a:t>
+            </a:r>
+          </a:p>
+          <a:p>
+            <a:pPr lvl="1"/>
+            <a:r>
+              <a:rPr lang="en-GB" dirty="0"/>
+              <a:t>Recursion and Tail call optimisation </a:t>
+            </a:r>
+          </a:p>
+          <a:p>
+            <a:pPr lvl="1"/>
+            <a:r>
+              <a:rPr lang="en-GB" dirty="0"/>
+              <a:t>Currying </a:t>
+            </a:r>
+          </a:p>
+          <a:p>
+            <a:pPr lvl="1"/>
+            <a:r>
+              <a:rPr lang="en-GB" dirty="0"/>
+              <a:t>Partial application</a:t>
+            </a:r>
+          </a:p>
+          <a:p>
+            <a:pPr lvl="1"/>
+            <a:r>
+              <a:rPr lang="en-GB" dirty="0"/>
+              <a:t>Pipelining </a:t>
+            </a:r>
+          </a:p>
+          <a:p>
+            <a:pPr lvl="1"/>
+            <a:r>
+              <a:rPr lang="en-GB" dirty="0"/>
+              <a:t>Algebraic Data Types</a:t>
+            </a:r>
+          </a:p>
+          <a:p>
+            <a:pPr lvl="1"/>
+            <a:r>
+              <a:rPr lang="en-GB" dirty="0"/>
+              <a:t>Immutable Data</a:t>
+            </a:r>
+          </a:p>
+          <a:p>
+            <a:pPr lvl="1"/>
+            <a:r>
+              <a:rPr lang="en-GB" dirty="0"/>
+              <a:t>Pattern Matching</a:t>
+            </a:r>
+          </a:p>
+          <a:p>
+            <a:pPr lvl="1"/>
+            <a:r>
+              <a:rPr lang="en-GB" dirty="0"/>
+              <a:t>Laziness</a:t>
+            </a:r>
+          </a:p>
+          <a:p>
+            <a:pPr marL="457200" lvl="1" indent="0">
               <a:buNone/>
             </a:pPr>
             <a:endParaRPr lang="en-GB" dirty="0"/>
           </a:p>
           <a:p>
+            <a:pPr marL="457200" lvl="1" indent="0">
+              <a:buNone/>
+            </a:pPr>
+            <a:endParaRPr lang="en-GB" dirty="0"/>
+          </a:p>
+          <a:p>
+            <a:pPr lvl="1"/>
             <a:endParaRPr lang="en-GB" dirty="0"/>
           </a:p>
         </p:txBody>
@@ -7495,7 +7372,7 @@
     </p:spTree>
     <p:extLst>
       <p:ext uri="{BB962C8B-B14F-4D97-AF65-F5344CB8AC3E}">
-        <p14:creationId xmlns:p14="http://schemas.microsoft.com/office/powerpoint/2010/main" val="3554641445"/>
+        <p14:creationId xmlns:p14="http://schemas.microsoft.com/office/powerpoint/2010/main" val="3132465871"/>
       </p:ext>
     </p:extLst>
   </p:cSld>
@@ -7527,7 +7404,7 @@
           <p:cNvPr id="2" name="Title 1">
             <a:extLst>
               <a:ext uri="{FF2B5EF4-FFF2-40B4-BE49-F238E27FC236}">
-                <a16:creationId xmlns:a16="http://schemas.microsoft.com/office/drawing/2014/main" id="{95BAC10B-5402-42E4-AD48-A5265B068621}"/>
+                <a16:creationId xmlns:a16="http://schemas.microsoft.com/office/drawing/2014/main" id="{C3EA0152-43CF-49A3-9F27-D6055A3185BA}"/>
               </a:ext>
             </a:extLst>
           </p:cNvPr>
@@ -7538,19 +7415,14 @@
             <p:ph type="title"/>
           </p:nvPr>
         </p:nvSpPr>
-        <p:spPr>
-          <a:xfrm>
-            <a:off x="677334" y="609600"/>
-            <a:ext cx="8596668" cy="864093"/>
-          </a:xfrm>
-        </p:spPr>
-        <p:txBody>
-          <a:bodyPr/>
-          <a:lstStyle/>
-          <a:p>
-            <a:r>
-              <a:rPr lang="en-GB" dirty="0"/>
-              <a:t>Functional First Programming with F#</a:t>
+        <p:spPr/>
+        <p:txBody>
+          <a:bodyPr/>
+          <a:lstStyle/>
+          <a:p>
+            <a:r>
+              <a:rPr lang="en-GB" dirty="0"/>
+              <a:t>Functional programming characteristics</a:t>
             </a:r>
           </a:p>
         </p:txBody>
@@ -7560,7 +7432,7 @@
           <p:cNvPr id="3" name="Content Placeholder 2">
             <a:extLst>
               <a:ext uri="{FF2B5EF4-FFF2-40B4-BE49-F238E27FC236}">
-                <a16:creationId xmlns:a16="http://schemas.microsoft.com/office/drawing/2014/main" id="{A5CC9200-C372-4FE5-8C50-BE5E49CA61A2}"/>
+                <a16:creationId xmlns:a16="http://schemas.microsoft.com/office/drawing/2014/main" id="{4D41C678-B6AD-4294-8012-E0E1885FE9F2}"/>
               </a:ext>
             </a:extLst>
           </p:cNvPr>
@@ -7573,8 +7445,8 @@
         </p:nvSpPr>
         <p:spPr>
           <a:xfrm>
-            <a:off x="677334" y="1473693"/>
-            <a:ext cx="8596668" cy="4567669"/>
+            <a:off x="677334" y="1571349"/>
+            <a:ext cx="8596668" cy="4470014"/>
           </a:xfrm>
         </p:spPr>
         <p:txBody>
@@ -7586,71 +7458,94 @@
             </a:pPr>
             <a:r>
               <a:rPr lang="en-GB" dirty="0"/>
-              <a:t>Benefits: </a:t>
-            </a:r>
-          </a:p>
-          <a:p>
-            <a:r>
-              <a:rPr lang="en-GB" dirty="0"/>
-              <a:t>A Multiparadigm language, OO and imperative is just as easy as in C#</a:t>
-            </a:r>
-          </a:p>
-          <a:p>
-            <a:r>
-              <a:rPr lang="en-GB" dirty="0"/>
-              <a:t>Strong community</a:t>
-            </a:r>
-          </a:p>
-          <a:p>
-            <a:r>
-              <a:rPr lang="en-GB" dirty="0"/>
-              <a:t>Concise but readable syntax and easy to understand</a:t>
-            </a:r>
-          </a:p>
-          <a:p>
-            <a:r>
-              <a:rPr lang="en-GB" dirty="0"/>
-              <a:t>Full .NET Interop</a:t>
-            </a:r>
-          </a:p>
-          <a:p>
-            <a:r>
-              <a:rPr lang="en-GB" dirty="0"/>
-              <a:t>F# -&gt; </a:t>
-            </a:r>
-            <a:r>
-              <a:rPr lang="en-GB" dirty="0" err="1"/>
-              <a:t>Javascript</a:t>
-            </a:r>
-            <a:r>
-              <a:rPr lang="en-GB" dirty="0"/>
-              <a:t> compiler with Fable</a:t>
-            </a:r>
-          </a:p>
-          <a:p>
-            <a:r>
-              <a:rPr lang="en-GB" dirty="0"/>
-              <a:t>Multiplatform</a:t>
-            </a:r>
-          </a:p>
-          <a:p>
-            <a:r>
-              <a:rPr lang="en-GB" dirty="0"/>
-              <a:t>Xamarin support</a:t>
-            </a:r>
-          </a:p>
-          <a:p>
-            <a:r>
-              <a:rPr lang="en-GB" dirty="0"/>
-              <a:t>Can use Visual Studio, Visual Studio code, or Rider</a:t>
-            </a:r>
+              <a:t>Essentially all of the important stuff:</a:t>
+            </a:r>
+          </a:p>
+          <a:p>
+            <a:pPr lvl="1"/>
+            <a:r>
+              <a:rPr lang="en-GB" dirty="0"/>
+              <a:t>First class functions (Higher order functions etc) – Functions</a:t>
+            </a:r>
+          </a:p>
+          <a:p>
+            <a:pPr lvl="1"/>
+            <a:r>
+              <a:rPr lang="en-GB" dirty="0"/>
+              <a:t>Recursion and Tail call optimisation - Functions</a:t>
+            </a:r>
+          </a:p>
+          <a:p>
+            <a:pPr lvl="1"/>
+            <a:r>
+              <a:rPr lang="en-GB" dirty="0"/>
+              <a:t>Currying - Functions</a:t>
+            </a:r>
+          </a:p>
+          <a:p>
+            <a:pPr lvl="1"/>
+            <a:r>
+              <a:rPr lang="en-GB" dirty="0"/>
+              <a:t>Partial application - Functions</a:t>
+            </a:r>
+          </a:p>
+          <a:p>
+            <a:pPr lvl="1"/>
+            <a:r>
+              <a:rPr lang="en-GB" dirty="0"/>
+              <a:t>Pipelining - Functions</a:t>
+            </a:r>
+          </a:p>
+          <a:p>
+            <a:pPr lvl="1"/>
+            <a:r>
+              <a:rPr lang="en-GB" dirty="0"/>
+              <a:t>Algebraic Data Types – Data</a:t>
+            </a:r>
+          </a:p>
+          <a:p>
+            <a:pPr lvl="1"/>
+            <a:r>
+              <a:rPr lang="en-GB" dirty="0"/>
+              <a:t>Immutable Data - Data</a:t>
+            </a:r>
+          </a:p>
+          <a:p>
+            <a:pPr lvl="1"/>
+            <a:r>
+              <a:rPr lang="en-GB" dirty="0"/>
+              <a:t>Pattern Matching – Data and Functions</a:t>
+            </a:r>
+          </a:p>
+          <a:p>
+            <a:pPr lvl="1"/>
+            <a:r>
+              <a:rPr lang="en-GB" dirty="0"/>
+              <a:t>Laziness – Functions and ??</a:t>
+            </a:r>
+          </a:p>
+          <a:p>
+            <a:pPr marL="457200" lvl="1" indent="0">
+              <a:buNone/>
+            </a:pPr>
+            <a:endParaRPr lang="en-GB" dirty="0"/>
+          </a:p>
+          <a:p>
+            <a:pPr marL="457200" lvl="1" indent="0">
+              <a:buNone/>
+            </a:pPr>
+            <a:endParaRPr lang="en-GB" dirty="0"/>
+          </a:p>
+          <a:p>
+            <a:pPr lvl="1"/>
+            <a:endParaRPr lang="en-GB" dirty="0"/>
           </a:p>
         </p:txBody>
       </p:sp>
     </p:spTree>
     <p:extLst>
       <p:ext uri="{BB962C8B-B14F-4D97-AF65-F5344CB8AC3E}">
-        <p14:creationId xmlns:p14="http://schemas.microsoft.com/office/powerpoint/2010/main" val="1595959429"/>
+        <p14:creationId xmlns:p14="http://schemas.microsoft.com/office/powerpoint/2010/main" val="1187350171"/>
       </p:ext>
     </p:extLst>
   </p:cSld>
@@ -7729,45 +7624,74 @@
         <p:spPr>
           <a:xfrm>
             <a:off x="677334" y="1473693"/>
-            <a:ext cx="8596668" cy="4567669"/>
+            <a:ext cx="9105858" cy="4567669"/>
           </a:xfrm>
         </p:spPr>
         <p:txBody>
           <a:bodyPr/>
           <a:lstStyle/>
           <a:p>
+            <a:r>
+              <a:rPr lang="en-GB" dirty="0"/>
+              <a:t>We will talk about this properly later, but what is Functional First Programming and why F#? </a:t>
+            </a:r>
+          </a:p>
+          <a:p>
+            <a:endParaRPr lang="en-GB" dirty="0"/>
+          </a:p>
+          <a:p>
             <a:pPr marL="0" indent="0">
               <a:buNone/>
             </a:pPr>
             <a:r>
-              <a:rPr lang="en-GB" dirty="0"/>
-              <a:t>Issues: </a:t>
-            </a:r>
-          </a:p>
-          <a:p>
-            <a:r>
-              <a:rPr lang="en-GB" dirty="0"/>
-              <a:t>No Type classes (Yet)</a:t>
-            </a:r>
-          </a:p>
-          <a:p>
-            <a:r>
-              <a:rPr lang="en-GB" dirty="0"/>
-              <a:t>Not as good treatment in comparison to C# from Microsoft at the moment, so development setup isn’t perfect at the moment</a:t>
-            </a:r>
-          </a:p>
-          <a:p>
-            <a:r>
-              <a:rPr lang="en-GB" dirty="0"/>
-              <a:t>C# is a really good language</a:t>
-            </a:r>
+              <a:rPr lang="en-GB" i="1" dirty="0"/>
+              <a:t>"There is an interesting phenomenon happening at Xamarin. Whenever one of our engineers starts working with F#, they tend to embrace it and stay there." </a:t>
+            </a:r>
+            <a:br>
+              <a:rPr lang="en-GB" dirty="0"/>
+            </a:br>
+            <a:endParaRPr lang="en-GB" dirty="0"/>
+          </a:p>
+          <a:p>
+            <a:pPr marL="0" indent="0">
+              <a:buNone/>
+            </a:pPr>
+            <a:r>
+              <a:rPr lang="en-GB" dirty="0"/>
+              <a:t>Miguel de </a:t>
+            </a:r>
+            <a:r>
+              <a:rPr lang="en-GB" dirty="0" err="1"/>
+              <a:t>Icaza</a:t>
+            </a:r>
+            <a:r>
+              <a:rPr lang="en-GB" dirty="0"/>
+              <a:t>, best known for starting the </a:t>
+            </a:r>
+            <a:r>
+              <a:rPr lang="en-GB" dirty="0" err="1"/>
+              <a:t>GNOME,Mono</a:t>
+            </a:r>
+            <a:r>
+              <a:rPr lang="en-GB" dirty="0"/>
+              <a:t> and Xamarin projects</a:t>
+            </a:r>
+          </a:p>
+          <a:p>
+            <a:pPr marL="0" indent="0">
+              <a:buNone/>
+            </a:pPr>
+            <a:endParaRPr lang="en-GB" dirty="0"/>
+          </a:p>
+          <a:p>
+            <a:endParaRPr lang="en-GB" dirty="0"/>
           </a:p>
         </p:txBody>
       </p:sp>
     </p:spTree>
     <p:extLst>
       <p:ext uri="{BB962C8B-B14F-4D97-AF65-F5344CB8AC3E}">
-        <p14:creationId xmlns:p14="http://schemas.microsoft.com/office/powerpoint/2010/main" val="640178609"/>
+        <p14:creationId xmlns:p14="http://schemas.microsoft.com/office/powerpoint/2010/main" val="3554641445"/>
       </p:ext>
     </p:extLst>
   </p:cSld>
@@ -7799,7 +7723,7 @@
           <p:cNvPr id="2" name="Title 1">
             <a:extLst>
               <a:ext uri="{FF2B5EF4-FFF2-40B4-BE49-F238E27FC236}">
-                <a16:creationId xmlns:a16="http://schemas.microsoft.com/office/drawing/2014/main" id="{5BCD6D4A-1CE9-4B21-9F15-722BB6F2168A}"/>
+                <a16:creationId xmlns:a16="http://schemas.microsoft.com/office/drawing/2014/main" id="{95BAC10B-5402-42E4-AD48-A5265B068621}"/>
               </a:ext>
             </a:extLst>
           </p:cNvPr>
@@ -7810,24 +7734,29 @@
             <p:ph type="title"/>
           </p:nvPr>
         </p:nvSpPr>
-        <p:spPr/>
-        <p:txBody>
-          <a:bodyPr/>
-          <a:lstStyle/>
-          <a:p>
-            <a:r>
-              <a:rPr lang="en-GB" dirty="0"/>
-              <a:t>Functional / Declarative vs OO / Imperative breakdown</a:t>
-            </a:r>
-          </a:p>
-        </p:txBody>
-      </p:sp>
-      <p:sp>
-        <p:nvSpPr>
-          <p:cNvPr id="3" name="Text Placeholder 2">
+        <p:spPr>
+          <a:xfrm>
+            <a:off x="677334" y="609600"/>
+            <a:ext cx="8596668" cy="864093"/>
+          </a:xfrm>
+        </p:spPr>
+        <p:txBody>
+          <a:bodyPr/>
+          <a:lstStyle/>
+          <a:p>
+            <a:r>
+              <a:rPr lang="en-GB" dirty="0"/>
+              <a:t>Functional First Programming with F#</a:t>
+            </a:r>
+          </a:p>
+        </p:txBody>
+      </p:sp>
+      <p:sp>
+        <p:nvSpPr>
+          <p:cNvPr id="3" name="Content Placeholder 2">
             <a:extLst>
               <a:ext uri="{FF2B5EF4-FFF2-40B4-BE49-F238E27FC236}">
-                <a16:creationId xmlns:a16="http://schemas.microsoft.com/office/drawing/2014/main" id="{5EBE161B-7F3A-4896-9715-C78A36DEFBAC}"/>
+                <a16:creationId xmlns:a16="http://schemas.microsoft.com/office/drawing/2014/main" id="{A5CC9200-C372-4FE5-8C50-BE5E49CA61A2}"/>
               </a:ext>
             </a:extLst>
           </p:cNvPr>
@@ -7835,17 +7764,81 @@
             <a:spLocks noGrp="1"/>
           </p:cNvSpPr>
           <p:nvPr>
-            <p:ph type="body" idx="1"/>
-          </p:nvPr>
-        </p:nvSpPr>
-        <p:spPr/>
-        <p:txBody>
-          <a:bodyPr/>
-          <a:lstStyle/>
-          <a:p>
-            <a:r>
-              <a:rPr lang="en-GB" dirty="0"/>
-              <a:t>Finally some code!</a:t>
+            <p:ph idx="1"/>
+          </p:nvPr>
+        </p:nvSpPr>
+        <p:spPr>
+          <a:xfrm>
+            <a:off x="677334" y="1473693"/>
+            <a:ext cx="8596668" cy="4567669"/>
+          </a:xfrm>
+        </p:spPr>
+        <p:txBody>
+          <a:bodyPr/>
+          <a:lstStyle/>
+          <a:p>
+            <a:pPr marL="0" indent="0">
+              <a:buNone/>
+            </a:pPr>
+            <a:r>
+              <a:rPr lang="en-GB" dirty="0"/>
+              <a:t>Benefits: </a:t>
+            </a:r>
+          </a:p>
+          <a:p>
+            <a:r>
+              <a:rPr lang="en-GB" dirty="0"/>
+              <a:t>A Multiparadigm language, OO and imperative is just as easy as in C#</a:t>
+            </a:r>
+          </a:p>
+          <a:p>
+            <a:r>
+              <a:rPr lang="en-GB" dirty="0"/>
+              <a:t>Strong community</a:t>
+            </a:r>
+          </a:p>
+          <a:p>
+            <a:r>
+              <a:rPr lang="en-GB" dirty="0"/>
+              <a:t>Concise but readable syntax and easy to understand</a:t>
+            </a:r>
+          </a:p>
+          <a:p>
+            <a:r>
+              <a:rPr lang="en-GB" dirty="0"/>
+              <a:t>Full .NET Interop</a:t>
+            </a:r>
+          </a:p>
+          <a:p>
+            <a:r>
+              <a:rPr lang="en-GB" dirty="0"/>
+              <a:t>F# -&gt; </a:t>
+            </a:r>
+            <a:r>
+              <a:rPr lang="en-GB" dirty="0" err="1"/>
+              <a:t>Javascript</a:t>
+            </a:r>
+            <a:r>
+              <a:rPr lang="en-GB" dirty="0"/>
+              <a:t> compiler with Fable</a:t>
+            </a:r>
+          </a:p>
+          <a:p>
+            <a:r>
+              <a:rPr lang="en-GB" dirty="0"/>
+              <a:t>Multiplatform</a:t>
+            </a:r>
+          </a:p>
+          <a:p>
+            <a:r>
+              <a:rPr lang="en-GB" dirty="0"/>
+              <a:t>Xamarin support</a:t>
+            </a:r>
+          </a:p>
+          <a:p>
+            <a:r>
+              <a:rPr lang="en-GB" dirty="0"/>
+              <a:t>Can use Visual Studio, Visual Studio code, or Rider</a:t>
             </a:r>
           </a:p>
         </p:txBody>
@@ -7853,7 +7846,7 @@
     </p:spTree>
     <p:extLst>
       <p:ext uri="{BB962C8B-B14F-4D97-AF65-F5344CB8AC3E}">
-        <p14:creationId xmlns:p14="http://schemas.microsoft.com/office/powerpoint/2010/main" val="1351044412"/>
+        <p14:creationId xmlns:p14="http://schemas.microsoft.com/office/powerpoint/2010/main" val="1595959429"/>
       </p:ext>
     </p:extLst>
   </p:cSld>
@@ -7885,7 +7878,7 @@
           <p:cNvPr id="2" name="Title 1">
             <a:extLst>
               <a:ext uri="{FF2B5EF4-FFF2-40B4-BE49-F238E27FC236}">
-                <a16:creationId xmlns:a16="http://schemas.microsoft.com/office/drawing/2014/main" id="{DBF56B8E-2F55-4DA2-9AA6-3828B040BF41}"/>
+                <a16:creationId xmlns:a16="http://schemas.microsoft.com/office/drawing/2014/main" id="{95BAC10B-5402-42E4-AD48-A5265B068621}"/>
               </a:ext>
             </a:extLst>
           </p:cNvPr>
@@ -7896,14 +7889,19 @@
             <p:ph type="title"/>
           </p:nvPr>
         </p:nvSpPr>
-        <p:spPr/>
-        <p:txBody>
-          <a:bodyPr/>
-          <a:lstStyle/>
-          <a:p>
-            <a:r>
-              <a:rPr lang="en-GB" dirty="0"/>
-              <a:t>FP / Declarative vs Imperative</a:t>
+        <p:spPr>
+          <a:xfrm>
+            <a:off x="677334" y="609600"/>
+            <a:ext cx="8596668" cy="864093"/>
+          </a:xfrm>
+        </p:spPr>
+        <p:txBody>
+          <a:bodyPr/>
+          <a:lstStyle/>
+          <a:p>
+            <a:r>
+              <a:rPr lang="en-GB" dirty="0"/>
+              <a:t>Functional First Programming with F#</a:t>
             </a:r>
           </a:p>
         </p:txBody>
@@ -7913,7 +7911,7 @@
           <p:cNvPr id="3" name="Content Placeholder 2">
             <a:extLst>
               <a:ext uri="{FF2B5EF4-FFF2-40B4-BE49-F238E27FC236}">
-                <a16:creationId xmlns:a16="http://schemas.microsoft.com/office/drawing/2014/main" id="{B5EA96D2-D5D0-435C-AAE4-4ACF7825D090}"/>
+                <a16:creationId xmlns:a16="http://schemas.microsoft.com/office/drawing/2014/main" id="{A5CC9200-C372-4FE5-8C50-BE5E49CA61A2}"/>
               </a:ext>
             </a:extLst>
           </p:cNvPr>
@@ -7926,8 +7924,8 @@
         </p:nvSpPr>
         <p:spPr>
           <a:xfrm>
-            <a:off x="677333" y="2160589"/>
-            <a:ext cx="9363312" cy="3880773"/>
+            <a:off x="677334" y="1473693"/>
+            <a:ext cx="8596668" cy="4567669"/>
           </a:xfrm>
         </p:spPr>
         <p:txBody>
@@ -7938,65 +7936,34 @@
               <a:buNone/>
             </a:pPr>
             <a:r>
-              <a:rPr lang="en-GB" i="1" dirty="0"/>
-              <a:t>“Imperative programming accomplishes tasks by executing a series of commands.</a:t>
-            </a:r>
-            <a:br>
-              <a:rPr lang="en-GB" i="1" dirty="0"/>
-            </a:br>
-            <a:r>
-              <a:rPr lang="en-GB" i="1" dirty="0"/>
-              <a:t>[Control Flow]</a:t>
-            </a:r>
-            <a:br>
-              <a:rPr lang="en-GB" i="1" dirty="0"/>
-            </a:br>
-            <a:r>
-              <a:rPr lang="en-GB" i="1" dirty="0"/>
-              <a:t>Functional programming accomplishes tasks by describing the results with expressions.</a:t>
-            </a:r>
-            <a:br>
-              <a:rPr lang="en-GB" i="1" dirty="0"/>
-            </a:br>
-            <a:r>
-              <a:rPr lang="en-GB" i="1" dirty="0"/>
-              <a:t>[Data Flow]</a:t>
-            </a:r>
-            <a:br>
-              <a:rPr lang="en-GB" i="1" dirty="0"/>
-            </a:br>
-            <a:r>
-              <a:rPr lang="en-GB" i="1" dirty="0"/>
-              <a:t>“</a:t>
-            </a:r>
-          </a:p>
-          <a:p>
-            <a:pPr marL="0" indent="0">
-              <a:buNone/>
-            </a:pPr>
-            <a:br>
-              <a:rPr lang="en-GB" i="1" dirty="0"/>
-            </a:br>
-            <a:r>
-              <a:rPr lang="en-GB" dirty="0">
-                <a:hlinkClick r:id="rId2"/>
-              </a:rPr>
-              <a:t>https://magneticcoredump.squarespace.com/blog/what-is-the-difference-between-functional-and-imperative-programming</a:t>
-            </a:r>
-            <a:r>
-              <a:rPr lang="en-GB" dirty="0"/>
-              <a:t> </a:t>
-            </a:r>
-          </a:p>
-          <a:p>
-            <a:endParaRPr lang="en-GB" dirty="0"/>
+              <a:rPr lang="en-GB" dirty="0"/>
+              <a:t>Issues: </a:t>
+            </a:r>
+          </a:p>
+          <a:p>
+            <a:r>
+              <a:rPr lang="en-GB" dirty="0"/>
+              <a:t>No Type classes (Yet)</a:t>
+            </a:r>
+          </a:p>
+          <a:p>
+            <a:r>
+              <a:rPr lang="en-GB" dirty="0"/>
+              <a:t>Not as good treatment in comparison to C# from Microsoft at the moment, so development setup isn’t perfect at the moment</a:t>
+            </a:r>
+          </a:p>
+          <a:p>
+            <a:r>
+              <a:rPr lang="en-GB" dirty="0"/>
+              <a:t>C# is a really good language</a:t>
+            </a:r>
           </a:p>
         </p:txBody>
       </p:sp>
     </p:spTree>
     <p:extLst>
       <p:ext uri="{BB962C8B-B14F-4D97-AF65-F5344CB8AC3E}">
-        <p14:creationId xmlns:p14="http://schemas.microsoft.com/office/powerpoint/2010/main" val="3813737669"/>
+        <p14:creationId xmlns:p14="http://schemas.microsoft.com/office/powerpoint/2010/main" val="640178609"/>
       </p:ext>
     </p:extLst>
   </p:cSld>
@@ -8028,7 +7995,7 @@
           <p:cNvPr id="2" name="Title 1">
             <a:extLst>
               <a:ext uri="{FF2B5EF4-FFF2-40B4-BE49-F238E27FC236}">
-                <a16:creationId xmlns:a16="http://schemas.microsoft.com/office/drawing/2014/main" id="{81A5BDF8-ABAB-455C-9D2D-7C59AD38FFD5}"/>
+                <a16:creationId xmlns:a16="http://schemas.microsoft.com/office/drawing/2014/main" id="{5BCD6D4A-1CE9-4B21-9F15-722BB6F2168A}"/>
               </a:ext>
             </a:extLst>
           </p:cNvPr>
@@ -8046,17 +8013,17 @@
           <a:p>
             <a:r>
               <a:rPr lang="en-GB" dirty="0"/>
-              <a:t>FP / Declarative vs Imperative</a:t>
-            </a:r>
-          </a:p>
-        </p:txBody>
-      </p:sp>
-      <p:sp>
-        <p:nvSpPr>
-          <p:cNvPr id="3" name="Content Placeholder 2">
+              <a:t>Functional / Declarative vs OO / Imperative breakdown</a:t>
+            </a:r>
+          </a:p>
+        </p:txBody>
+      </p:sp>
+      <p:sp>
+        <p:nvSpPr>
+          <p:cNvPr id="3" name="Text Placeholder 2">
             <a:extLst>
               <a:ext uri="{FF2B5EF4-FFF2-40B4-BE49-F238E27FC236}">
-                <a16:creationId xmlns:a16="http://schemas.microsoft.com/office/drawing/2014/main" id="{896BC6C1-6D16-46D7-85DD-2805DC9458EB}"/>
+                <a16:creationId xmlns:a16="http://schemas.microsoft.com/office/drawing/2014/main" id="{5EBE161B-7F3A-4896-9715-C78A36DEFBAC}"/>
               </a:ext>
             </a:extLst>
           </p:cNvPr>
@@ -8064,17 +8031,17 @@
             <a:spLocks noGrp="1"/>
           </p:cNvSpPr>
           <p:nvPr>
-            <p:ph idx="1"/>
-          </p:nvPr>
-        </p:nvSpPr>
-        <p:spPr/>
-        <p:txBody>
-          <a:bodyPr/>
-          <a:lstStyle/>
-          <a:p>
-            <a:r>
-              <a:rPr lang="en-GB" dirty="0"/>
-              <a:t>To Visual Studio!</a:t>
+            <p:ph type="body" idx="1"/>
+          </p:nvPr>
+        </p:nvSpPr>
+        <p:spPr/>
+        <p:txBody>
+          <a:bodyPr/>
+          <a:lstStyle/>
+          <a:p>
+            <a:r>
+              <a:rPr lang="en-GB" dirty="0"/>
+              <a:t>Finally some code!</a:t>
             </a:r>
           </a:p>
         </p:txBody>
@@ -8082,7 +8049,7 @@
     </p:spTree>
     <p:extLst>
       <p:ext uri="{BB962C8B-B14F-4D97-AF65-F5344CB8AC3E}">
-        <p14:creationId xmlns:p14="http://schemas.microsoft.com/office/powerpoint/2010/main" val="1629119169"/>
+        <p14:creationId xmlns:p14="http://schemas.microsoft.com/office/powerpoint/2010/main" val="1351044412"/>
       </p:ext>
     </p:extLst>
   </p:cSld>
@@ -8114,7 +8081,7 @@
           <p:cNvPr id="2" name="Title 1">
             <a:extLst>
               <a:ext uri="{FF2B5EF4-FFF2-40B4-BE49-F238E27FC236}">
-                <a16:creationId xmlns:a16="http://schemas.microsoft.com/office/drawing/2014/main" id="{81A5BDF8-ABAB-455C-9D2D-7C59AD38FFD5}"/>
+                <a16:creationId xmlns:a16="http://schemas.microsoft.com/office/drawing/2014/main" id="{DBF56B8E-2F55-4DA2-9AA6-3828B040BF41}"/>
               </a:ext>
             </a:extLst>
           </p:cNvPr>
@@ -8132,7 +8099,7 @@
           <a:p>
             <a:r>
               <a:rPr lang="en-GB" dirty="0"/>
-              <a:t>FP / Declarative vs OO</a:t>
+              <a:t>FP / Declarative vs Imperative</a:t>
             </a:r>
           </a:p>
         </p:txBody>
@@ -8142,7 +8109,7 @@
           <p:cNvPr id="3" name="Content Placeholder 2">
             <a:extLst>
               <a:ext uri="{FF2B5EF4-FFF2-40B4-BE49-F238E27FC236}">
-                <a16:creationId xmlns:a16="http://schemas.microsoft.com/office/drawing/2014/main" id="{896BC6C1-6D16-46D7-85DD-2805DC9458EB}"/>
+                <a16:creationId xmlns:a16="http://schemas.microsoft.com/office/drawing/2014/main" id="{B5EA96D2-D5D0-435C-AAE4-4ACF7825D090}"/>
               </a:ext>
             </a:extLst>
           </p:cNvPr>
@@ -8153,7 +8120,12 @@
             <p:ph idx="1"/>
           </p:nvPr>
         </p:nvSpPr>
-        <p:spPr/>
+        <p:spPr>
+          <a:xfrm>
+            <a:off x="677333" y="2160589"/>
+            <a:ext cx="9363312" cy="3880773"/>
+          </a:xfrm>
+        </p:spPr>
         <p:txBody>
           <a:bodyPr/>
           <a:lstStyle/>
@@ -8163,18 +8135,56 @@
             </a:pPr>
             <a:r>
               <a:rPr lang="en-GB" i="1" dirty="0"/>
-              <a:t>"OO makes code understandable by encapsulating moving parts. FP makes code understandable by minimizing moving parts." </a:t>
-            </a:r>
-          </a:p>
-          <a:p>
-            <a:r>
-              <a:rPr lang="en-GB" dirty="0"/>
-              <a:t>Michael Feathers @</a:t>
-            </a:r>
-            <a:r>
-              <a:rPr lang="en-GB" dirty="0" err="1"/>
-              <a:t>mfeathers</a:t>
-            </a:r>
+              <a:t>“Imperative programming accomplishes tasks by executing a series of commands.</a:t>
+            </a:r>
+            <a:br>
+              <a:rPr lang="en-GB" i="1" dirty="0"/>
+            </a:br>
+            <a:r>
+              <a:rPr lang="en-GB" i="1" dirty="0"/>
+              <a:t>[Control Flow]</a:t>
+            </a:r>
+            <a:br>
+              <a:rPr lang="en-GB" i="1" dirty="0"/>
+            </a:br>
+            <a:r>
+              <a:rPr lang="en-GB" i="1" dirty="0"/>
+              <a:t>Functional programming accomplishes tasks by describing the results with expressions.</a:t>
+            </a:r>
+            <a:br>
+              <a:rPr lang="en-GB" i="1" dirty="0"/>
+            </a:br>
+            <a:r>
+              <a:rPr lang="en-GB" i="1" dirty="0"/>
+              <a:t>[Data Flow]</a:t>
+            </a:r>
+            <a:br>
+              <a:rPr lang="en-GB" i="1" dirty="0"/>
+            </a:br>
+            <a:r>
+              <a:rPr lang="en-GB" i="1" dirty="0"/>
+              <a:t>“</a:t>
+            </a:r>
+          </a:p>
+          <a:p>
+            <a:pPr marL="0" indent="0">
+              <a:buNone/>
+            </a:pPr>
+            <a:br>
+              <a:rPr lang="en-GB" i="1" dirty="0"/>
+            </a:br>
+            <a:r>
+              <a:rPr lang="en-GB" dirty="0">
+                <a:hlinkClick r:id="rId2"/>
+              </a:rPr>
+              <a:t>https://magneticcoredump.squarespace.com/blog/what-is-the-difference-between-functional-and-imperative-programming</a:t>
+            </a:r>
+            <a:r>
+              <a:rPr lang="en-GB" dirty="0"/>
+              <a:t> </a:t>
+            </a:r>
+          </a:p>
+          <a:p>
             <a:endParaRPr lang="en-GB" dirty="0"/>
           </a:p>
         </p:txBody>
@@ -8182,7 +8192,7 @@
     </p:spTree>
     <p:extLst>
       <p:ext uri="{BB962C8B-B14F-4D97-AF65-F5344CB8AC3E}">
-        <p14:creationId xmlns:p14="http://schemas.microsoft.com/office/powerpoint/2010/main" val="608596680"/>
+        <p14:creationId xmlns:p14="http://schemas.microsoft.com/office/powerpoint/2010/main" val="3813737669"/>
       </p:ext>
     </p:extLst>
   </p:cSld>
@@ -8232,7 +8242,7 @@
           <a:p>
             <a:r>
               <a:rPr lang="en-GB" dirty="0"/>
-              <a:t>FP / Declarative vs OO</a:t>
+              <a:t>FP / Declarative vs Imperative</a:t>
             </a:r>
           </a:p>
         </p:txBody>
@@ -8260,13 +8270,7 @@
           <a:p>
             <a:r>
               <a:rPr lang="en-GB" dirty="0"/>
-              <a:t>OO: Data and methods / functions are bound together. State is hidden through encapsulation, and objects work together by calling methods on other objects (Basically messaging)</a:t>
-            </a:r>
-          </a:p>
-          <a:p>
-            <a:r>
-              <a:rPr lang="en-GB" dirty="0"/>
-              <a:t>FP: Data and functions are separated.  State is made more explicit, and we aim to control and minimise the number of ways that state can change. </a:t>
+              <a:t>To Visual Studio!</a:t>
             </a:r>
           </a:p>
         </p:txBody>
@@ -8274,7 +8278,7 @@
     </p:spTree>
     <p:extLst>
       <p:ext uri="{BB962C8B-B14F-4D97-AF65-F5344CB8AC3E}">
-        <p14:creationId xmlns:p14="http://schemas.microsoft.com/office/powerpoint/2010/main" val="3204509496"/>
+        <p14:creationId xmlns:p14="http://schemas.microsoft.com/office/powerpoint/2010/main" val="1629119169"/>
       </p:ext>
     </p:extLst>
   </p:cSld>
@@ -8350,23 +8354,31 @@
           <a:bodyPr/>
           <a:lstStyle/>
           <a:p>
-            <a:r>
-              <a:rPr lang="en-GB" dirty="0"/>
-              <a:t>For FP in the purest sense, there are no side effects. However, for a useful program we need them! </a:t>
-            </a:r>
-          </a:p>
-          <a:p>
-            <a:r>
-              <a:rPr lang="en-GB" dirty="0"/>
-              <a:t>So, we aim to constrain where side effects happen so that things are easier to reason about. </a:t>
-            </a:r>
+            <a:pPr marL="0" indent="0">
+              <a:buNone/>
+            </a:pPr>
+            <a:r>
+              <a:rPr lang="en-GB" i="1" dirty="0"/>
+              <a:t>"OO makes code understandable by encapsulating moving parts. FP makes code understandable by minimizing moving parts." </a:t>
+            </a:r>
+          </a:p>
+          <a:p>
+            <a:r>
+              <a:rPr lang="en-GB" dirty="0"/>
+              <a:t>Michael Feathers @</a:t>
+            </a:r>
+            <a:r>
+              <a:rPr lang="en-GB" dirty="0" err="1"/>
+              <a:t>mfeathers</a:t>
+            </a:r>
+            <a:endParaRPr lang="en-GB" dirty="0"/>
           </a:p>
         </p:txBody>
       </p:sp>
     </p:spTree>
     <p:extLst>
       <p:ext uri="{BB962C8B-B14F-4D97-AF65-F5344CB8AC3E}">
-        <p14:creationId xmlns:p14="http://schemas.microsoft.com/office/powerpoint/2010/main" val="3950671963"/>
+        <p14:creationId xmlns:p14="http://schemas.microsoft.com/office/powerpoint/2010/main" val="608596680"/>
       </p:ext>
     </p:extLst>
   </p:cSld>
@@ -8444,7 +8456,13 @@
           <a:p>
             <a:r>
               <a:rPr lang="en-GB" dirty="0"/>
-              <a:t>To Visual Studio!</a:t>
+              <a:t>OO: Data and methods / functions are bound together. State is hidden through encapsulation, and objects work together by calling methods on other objects (Basically messaging)</a:t>
+            </a:r>
+          </a:p>
+          <a:p>
+            <a:r>
+              <a:rPr lang="en-GB" dirty="0"/>
+              <a:t>FP: Data and functions are separated.  State is made more explicit, and we aim to control and minimise the number of ways that state can change. </a:t>
             </a:r>
           </a:p>
         </p:txBody>
@@ -8452,7 +8470,7 @@
     </p:spTree>
     <p:extLst>
       <p:ext uri="{BB962C8B-B14F-4D97-AF65-F5344CB8AC3E}">
-        <p14:creationId xmlns:p14="http://schemas.microsoft.com/office/powerpoint/2010/main" val="3388810031"/>
+        <p14:creationId xmlns:p14="http://schemas.microsoft.com/office/powerpoint/2010/main" val="3204509496"/>
       </p:ext>
     </p:extLst>
   </p:cSld>
@@ -8567,7 +8585,7 @@
           <p:cNvPr id="2" name="Title 1">
             <a:extLst>
               <a:ext uri="{FF2B5EF4-FFF2-40B4-BE49-F238E27FC236}">
-                <a16:creationId xmlns:a16="http://schemas.microsoft.com/office/drawing/2014/main" id="{5619B2FC-BFE2-45AC-8473-A5D0B9F8AA56}"/>
+                <a16:creationId xmlns:a16="http://schemas.microsoft.com/office/drawing/2014/main" id="{81A5BDF8-ABAB-455C-9D2D-7C59AD38FFD5}"/>
               </a:ext>
             </a:extLst>
           </p:cNvPr>
@@ -8585,7 +8603,7 @@
           <a:p>
             <a:r>
               <a:rPr lang="en-GB" dirty="0"/>
-              <a:t>Refactoring from Imperative</a:t>
+              <a:t>FP / Declarative vs OO</a:t>
             </a:r>
           </a:p>
         </p:txBody>
@@ -8595,7 +8613,7 @@
           <p:cNvPr id="3" name="Content Placeholder 2">
             <a:extLst>
               <a:ext uri="{FF2B5EF4-FFF2-40B4-BE49-F238E27FC236}">
-                <a16:creationId xmlns:a16="http://schemas.microsoft.com/office/drawing/2014/main" id="{9082F3DA-CFB7-4056-85DF-AF4932092BE1}"/>
+                <a16:creationId xmlns:a16="http://schemas.microsoft.com/office/drawing/2014/main" id="{896BC6C1-6D16-46D7-85DD-2805DC9458EB}"/>
               </a:ext>
             </a:extLst>
           </p:cNvPr>
@@ -8613,7 +8631,13 @@
           <a:p>
             <a:r>
               <a:rPr lang="en-GB" dirty="0"/>
-              <a:t>Using Filters</a:t>
+              <a:t>For FP in the purest sense, there are no side effects. However, for a useful program we need them! </a:t>
+            </a:r>
+          </a:p>
+          <a:p>
+            <a:r>
+              <a:rPr lang="en-GB" dirty="0"/>
+              <a:t>So, we aim to constrain where side effects happen so that things are easier to reason about. </a:t>
             </a:r>
           </a:p>
         </p:txBody>
@@ -8621,7 +8645,7 @@
     </p:spTree>
     <p:extLst>
       <p:ext uri="{BB962C8B-B14F-4D97-AF65-F5344CB8AC3E}">
-        <p14:creationId xmlns:p14="http://schemas.microsoft.com/office/powerpoint/2010/main" val="3643775625"/>
+        <p14:creationId xmlns:p14="http://schemas.microsoft.com/office/powerpoint/2010/main" val="3950671963"/>
       </p:ext>
     </p:extLst>
   </p:cSld>
@@ -8653,7 +8677,7 @@
           <p:cNvPr id="2" name="Title 1">
             <a:extLst>
               <a:ext uri="{FF2B5EF4-FFF2-40B4-BE49-F238E27FC236}">
-                <a16:creationId xmlns:a16="http://schemas.microsoft.com/office/drawing/2014/main" id="{5631F596-C35B-4304-B20B-DDDD081A15F9}"/>
+                <a16:creationId xmlns:a16="http://schemas.microsoft.com/office/drawing/2014/main" id="{81A5BDF8-ABAB-455C-9D2D-7C59AD38FFD5}"/>
               </a:ext>
             </a:extLst>
           </p:cNvPr>
@@ -8664,19 +8688,14 @@
             <p:ph type="title"/>
           </p:nvPr>
         </p:nvSpPr>
-        <p:spPr>
-          <a:xfrm>
-            <a:off x="677334" y="609600"/>
-            <a:ext cx="8596668" cy="899604"/>
-          </a:xfrm>
-        </p:spPr>
-        <p:txBody>
-          <a:bodyPr/>
-          <a:lstStyle/>
-          <a:p>
-            <a:r>
-              <a:rPr lang="en-GB" dirty="0"/>
-              <a:t>Exercise 00 </a:t>
+        <p:spPr/>
+        <p:txBody>
+          <a:bodyPr/>
+          <a:lstStyle/>
+          <a:p>
+            <a:r>
+              <a:rPr lang="en-GB" dirty="0"/>
+              <a:t>FP / Declarative vs OO</a:t>
             </a:r>
           </a:p>
         </p:txBody>
@@ -8686,7 +8705,7 @@
           <p:cNvPr id="3" name="Content Placeholder 2">
             <a:extLst>
               <a:ext uri="{FF2B5EF4-FFF2-40B4-BE49-F238E27FC236}">
-                <a16:creationId xmlns:a16="http://schemas.microsoft.com/office/drawing/2014/main" id="{D8B20300-040F-46A7-9181-4982E34FB03A}"/>
+                <a16:creationId xmlns:a16="http://schemas.microsoft.com/office/drawing/2014/main" id="{896BC6C1-6D16-46D7-85DD-2805DC9458EB}"/>
               </a:ext>
             </a:extLst>
           </p:cNvPr>
@@ -8704,55 +8723,15 @@
           <a:p>
             <a:r>
               <a:rPr lang="en-GB" dirty="0"/>
-              <a:t>Install F#: </a:t>
-            </a:r>
-            <a:r>
-              <a:rPr lang="en-GB" dirty="0">
-                <a:hlinkClick r:id="rId2"/>
-              </a:rPr>
-              <a:t>http://fsharp.org/use/windows/</a:t>
-            </a:r>
-            <a:r>
-              <a:rPr lang="en-GB" dirty="0"/>
-              <a:t> </a:t>
-            </a:r>
-          </a:p>
-          <a:p>
-            <a:r>
-              <a:rPr lang="en-GB" dirty="0"/>
-              <a:t>Install both Visual Studio and VS code and </a:t>
-            </a:r>
-            <a:r>
-              <a:rPr lang="en-GB" dirty="0" err="1"/>
-              <a:t>Ionide</a:t>
-            </a:r>
-            <a:r>
-              <a:rPr lang="en-GB" dirty="0"/>
-              <a:t> (I’m not sure which is best, so we may switch)</a:t>
-            </a:r>
-          </a:p>
-          <a:p>
-            <a:r>
-              <a:rPr lang="en-GB" dirty="0"/>
-              <a:t>Add F# to your path. Should be something like:</a:t>
-            </a:r>
-          </a:p>
-          <a:p>
-            <a:r>
-              <a:rPr lang="nn-NO" dirty="0"/>
-              <a:t>C:\Program Files (x86)\Microsoft SDKs\F#\4.1\Framework\v4.0 </a:t>
-            </a:r>
-            <a:endParaRPr lang="en-GB" dirty="0"/>
-          </a:p>
-          <a:p>
-            <a:endParaRPr lang="en-GB" dirty="0"/>
+              <a:t>To Visual Studio!</a:t>
+            </a:r>
           </a:p>
         </p:txBody>
       </p:sp>
     </p:spTree>
     <p:extLst>
       <p:ext uri="{BB962C8B-B14F-4D97-AF65-F5344CB8AC3E}">
-        <p14:creationId xmlns:p14="http://schemas.microsoft.com/office/powerpoint/2010/main" val="1106240761"/>
+        <p14:creationId xmlns:p14="http://schemas.microsoft.com/office/powerpoint/2010/main" val="3388810031"/>
       </p:ext>
     </p:extLst>
   </p:cSld>
@@ -8784,6 +8763,223 @@
           <p:cNvPr id="2" name="Title 1">
             <a:extLst>
               <a:ext uri="{FF2B5EF4-FFF2-40B4-BE49-F238E27FC236}">
+                <a16:creationId xmlns:a16="http://schemas.microsoft.com/office/drawing/2014/main" id="{5619B2FC-BFE2-45AC-8473-A5D0B9F8AA56}"/>
+              </a:ext>
+            </a:extLst>
+          </p:cNvPr>
+          <p:cNvSpPr>
+            <a:spLocks noGrp="1"/>
+          </p:cNvSpPr>
+          <p:nvPr>
+            <p:ph type="title"/>
+          </p:nvPr>
+        </p:nvSpPr>
+        <p:spPr/>
+        <p:txBody>
+          <a:bodyPr/>
+          <a:lstStyle/>
+          <a:p>
+            <a:r>
+              <a:rPr lang="en-GB" dirty="0"/>
+              <a:t>FP / Declarative vs OO</a:t>
+            </a:r>
+          </a:p>
+        </p:txBody>
+      </p:sp>
+      <p:sp>
+        <p:nvSpPr>
+          <p:cNvPr id="3" name="Content Placeholder 2">
+            <a:extLst>
+              <a:ext uri="{FF2B5EF4-FFF2-40B4-BE49-F238E27FC236}">
+                <a16:creationId xmlns:a16="http://schemas.microsoft.com/office/drawing/2014/main" id="{9082F3DA-CFB7-4056-85DF-AF4932092BE1}"/>
+              </a:ext>
+            </a:extLst>
+          </p:cNvPr>
+          <p:cNvSpPr>
+            <a:spLocks noGrp="1"/>
+          </p:cNvSpPr>
+          <p:nvPr>
+            <p:ph idx="1"/>
+          </p:nvPr>
+        </p:nvSpPr>
+        <p:spPr/>
+        <p:txBody>
+          <a:bodyPr/>
+          <a:lstStyle/>
+          <a:p>
+            <a:r>
+              <a:rPr lang="en-GB" dirty="0"/>
+              <a:t>Using Filters and F#</a:t>
+            </a:r>
+          </a:p>
+        </p:txBody>
+      </p:sp>
+    </p:spTree>
+    <p:extLst>
+      <p:ext uri="{BB962C8B-B14F-4D97-AF65-F5344CB8AC3E}">
+        <p14:creationId xmlns:p14="http://schemas.microsoft.com/office/powerpoint/2010/main" val="3643775625"/>
+      </p:ext>
+    </p:extLst>
+  </p:cSld>
+  <p:clrMapOvr>
+    <a:masterClrMapping/>
+  </p:clrMapOvr>
+</p:sld>
+</file>
+
+<file path=ppt/slides/slide33.xml><?xml version="1.0" encoding="utf-8"?>
+<p:sld xmlns:a="http://schemas.openxmlformats.org/drawingml/2006/main" xmlns:r="http://schemas.openxmlformats.org/officeDocument/2006/relationships" xmlns:p="http://schemas.openxmlformats.org/presentationml/2006/main">
+  <p:cSld>
+    <p:spTree>
+      <p:nvGrpSpPr>
+        <p:cNvPr id="1" name=""/>
+        <p:cNvGrpSpPr/>
+        <p:nvPr/>
+      </p:nvGrpSpPr>
+      <p:grpSpPr>
+        <a:xfrm>
+          <a:off x="0" y="0"/>
+          <a:ext cx="0" cy="0"/>
+          <a:chOff x="0" y="0"/>
+          <a:chExt cx="0" cy="0"/>
+        </a:xfrm>
+      </p:grpSpPr>
+      <p:sp>
+        <p:nvSpPr>
+          <p:cNvPr id="2" name="Title 1">
+            <a:extLst>
+              <a:ext uri="{FF2B5EF4-FFF2-40B4-BE49-F238E27FC236}">
+                <a16:creationId xmlns:a16="http://schemas.microsoft.com/office/drawing/2014/main" id="{5631F596-C35B-4304-B20B-DDDD081A15F9}"/>
+              </a:ext>
+            </a:extLst>
+          </p:cNvPr>
+          <p:cNvSpPr>
+            <a:spLocks noGrp="1"/>
+          </p:cNvSpPr>
+          <p:nvPr>
+            <p:ph type="title"/>
+          </p:nvPr>
+        </p:nvSpPr>
+        <p:spPr>
+          <a:xfrm>
+            <a:off x="677334" y="609600"/>
+            <a:ext cx="8596668" cy="899604"/>
+          </a:xfrm>
+        </p:spPr>
+        <p:txBody>
+          <a:bodyPr/>
+          <a:lstStyle/>
+          <a:p>
+            <a:r>
+              <a:rPr lang="en-GB" dirty="0"/>
+              <a:t>Exercise 00 </a:t>
+            </a:r>
+          </a:p>
+        </p:txBody>
+      </p:sp>
+      <p:sp>
+        <p:nvSpPr>
+          <p:cNvPr id="3" name="Content Placeholder 2">
+            <a:extLst>
+              <a:ext uri="{FF2B5EF4-FFF2-40B4-BE49-F238E27FC236}">
+                <a16:creationId xmlns:a16="http://schemas.microsoft.com/office/drawing/2014/main" id="{D8B20300-040F-46A7-9181-4982E34FB03A}"/>
+              </a:ext>
+            </a:extLst>
+          </p:cNvPr>
+          <p:cNvSpPr>
+            <a:spLocks noGrp="1"/>
+          </p:cNvSpPr>
+          <p:nvPr>
+            <p:ph idx="1"/>
+          </p:nvPr>
+        </p:nvSpPr>
+        <p:spPr/>
+        <p:txBody>
+          <a:bodyPr/>
+          <a:lstStyle/>
+          <a:p>
+            <a:r>
+              <a:rPr lang="en-GB" dirty="0"/>
+              <a:t>Install F#: </a:t>
+            </a:r>
+            <a:r>
+              <a:rPr lang="en-GB" dirty="0">
+                <a:hlinkClick r:id="rId2"/>
+              </a:rPr>
+              <a:t>http://fsharp.org/use/windows/</a:t>
+            </a:r>
+            <a:r>
+              <a:rPr lang="en-GB" dirty="0"/>
+              <a:t> </a:t>
+            </a:r>
+          </a:p>
+          <a:p>
+            <a:r>
+              <a:rPr lang="en-GB" dirty="0"/>
+              <a:t>Install both Visual Studio and VS code and </a:t>
+            </a:r>
+            <a:r>
+              <a:rPr lang="en-GB" dirty="0" err="1"/>
+              <a:t>Ionide</a:t>
+            </a:r>
+            <a:r>
+              <a:rPr lang="en-GB" dirty="0"/>
+              <a:t> (I’m not sure which is best, so we may switch)</a:t>
+            </a:r>
+          </a:p>
+          <a:p>
+            <a:r>
+              <a:rPr lang="en-GB" dirty="0"/>
+              <a:t>Add F# to your path. Should be something like:</a:t>
+            </a:r>
+          </a:p>
+          <a:p>
+            <a:r>
+              <a:rPr lang="nn-NO" dirty="0"/>
+              <a:t>C:\Program Files (x86)\Microsoft SDKs\F#\4.1\Framework\v4.0 </a:t>
+            </a:r>
+            <a:endParaRPr lang="en-GB" dirty="0"/>
+          </a:p>
+          <a:p>
+            <a:endParaRPr lang="en-GB" dirty="0"/>
+          </a:p>
+        </p:txBody>
+      </p:sp>
+    </p:spTree>
+    <p:extLst>
+      <p:ext uri="{BB962C8B-B14F-4D97-AF65-F5344CB8AC3E}">
+        <p14:creationId xmlns:p14="http://schemas.microsoft.com/office/powerpoint/2010/main" val="1106240761"/>
+      </p:ext>
+    </p:extLst>
+  </p:cSld>
+  <p:clrMapOvr>
+    <a:masterClrMapping/>
+  </p:clrMapOvr>
+</p:sld>
+</file>
+
+<file path=ppt/slides/slide34.xml><?xml version="1.0" encoding="utf-8"?>
+<p:sld xmlns:a="http://schemas.openxmlformats.org/drawingml/2006/main" xmlns:r="http://schemas.openxmlformats.org/officeDocument/2006/relationships" xmlns:p="http://schemas.openxmlformats.org/presentationml/2006/main">
+  <p:cSld>
+    <p:spTree>
+      <p:nvGrpSpPr>
+        <p:cNvPr id="1" name=""/>
+        <p:cNvGrpSpPr/>
+        <p:nvPr/>
+      </p:nvGrpSpPr>
+      <p:grpSpPr>
+        <a:xfrm>
+          <a:off x="0" y="0"/>
+          <a:ext cx="0" cy="0"/>
+          <a:chOff x="0" y="0"/>
+          <a:chExt cx="0" cy="0"/>
+        </a:xfrm>
+      </p:grpSpPr>
+      <p:sp>
+        <p:nvSpPr>
+          <p:cNvPr id="2" name="Title 1">
+            <a:extLst>
+              <a:ext uri="{FF2B5EF4-FFF2-40B4-BE49-F238E27FC236}">
                 <a16:creationId xmlns:a16="http://schemas.microsoft.com/office/drawing/2014/main" id="{681FAFFE-9FF8-4BD1-A6F6-7FE578FD4AC1}"/>
               </a:ext>
             </a:extLst>
@@ -8860,7 +9056,7 @@
 </p:sld>
 </file>
 
-<file path=ppt/slides/slide33.xml><?xml version="1.0" encoding="utf-8"?>
+<file path=ppt/slides/slide35.xml><?xml version="1.0" encoding="utf-8"?>
 <p:sld xmlns:a="http://schemas.openxmlformats.org/drawingml/2006/main" xmlns:r="http://schemas.openxmlformats.org/officeDocument/2006/relationships" xmlns:p="http://schemas.openxmlformats.org/presentationml/2006/main">
   <p:cSld>
     <p:spTree>
@@ -9179,6 +9375,16 @@
             </a:r>
           </a:p>
           <a:p>
+            <a:pPr marL="514350" indent="-514350">
+              <a:buFont typeface="+mj-lt"/>
+              <a:buAutoNum type="arabicPeriod"/>
+            </a:pPr>
+            <a:r>
+              <a:rPr lang="en-GB" dirty="0"/>
+              <a:t>For me: I want to get better</a:t>
+            </a:r>
+          </a:p>
+          <a:p>
             <a:endParaRPr lang="en-GB" dirty="0"/>
           </a:p>
         </p:txBody>
@@ -9602,7 +9808,7 @@
           <a:lstStyle/>
           <a:p>
             <a:r>
-              <a:rPr lang="en-GB"/>
+              <a:rPr lang="en-GB" dirty="0"/>
               <a:t>Project at the end? </a:t>
             </a:r>
           </a:p>

</xml_diff>